<commit_message>
[온라인 쇼핑몰] Logical Data Modeling(RM) 추가 PPT
</commit_message>
<xml_diff>
--- a/ERD Practice - 온라인 전자 상거래 플랫폼.pptx
+++ b/ERD Practice - 온라인 전자 상거래 플랫폼.pptx
@@ -7,6 +7,7 @@
   <p:sldIdLst>
     <p:sldId id="256" r:id="rId2"/>
     <p:sldId id="257" r:id="rId3"/>
+    <p:sldId id="258" r:id="rId4"/>
   </p:sldIdLst>
   <p:sldSz cx="12192000" cy="6858000"/>
   <p:notesSz cx="6858000" cy="9144000"/>
@@ -3390,31 +3391,6 @@
           </a:p>
         </p:txBody>
       </p:sp>
-      <p:sp>
-        <p:nvSpPr>
-          <p:cNvPr id="3" name="내용 개체 틀 2"/>
-          <p:cNvSpPr>
-            <a:spLocks noGrp="1"/>
-          </p:cNvSpPr>
-          <p:nvPr>
-            <p:ph idx="1"/>
-          </p:nvPr>
-        </p:nvSpPr>
-        <p:spPr/>
-        <p:txBody>
-          <a:bodyPr/>
-          <a:p>
-            <a:pPr lvl="0">
-              <a:defRPr/>
-            </a:pPr>
-            <a:r>
-              <a:rPr lang="ko-KR" altLang="en-US"/>
-              <a:t/>
-            </a:r>
-            <a:endParaRPr lang="ko-KR" altLang="en-US"/>
-          </a:p>
-        </p:txBody>
-      </p:sp>
       <p:pic>
         <p:nvPicPr>
           <p:cNvPr id="4" name="그림 3"/>
@@ -3443,6 +3419,114 @@
     <p:extLst>
       <p:ext uri="{BB962C8B-B14F-4D97-AF65-F5344CB8AC3E}">
         <p14:creationId xmlns:p14="http://schemas.microsoft.com/office/powerpoint/2010/main" val="3085012405"/>
+      </p:ext>
+    </p:extLst>
+  </p:cSld>
+  <p:clrMapOvr>
+    <a:masterClrMapping/>
+  </p:clrMapOvr>
+</p:sld>
+</file>
+
+<file path=ppt/slides/slide3.xml><?xml version="1.0" encoding="utf-8"?>
+<p:sld xmlns:r="http://schemas.openxmlformats.org/officeDocument/2006/relationships" xmlns:c="http://schemas.openxmlformats.org/drawingml/2006/chart" xmlns:a="http://schemas.openxmlformats.org/drawingml/2006/main" xmlns:dgm="http://schemas.openxmlformats.org/drawingml/2006/diagram" xmlns:dsp="http://schemas.microsoft.com/office/drawing/2008/diagram" xmlns:p="http://schemas.openxmlformats.org/presentationml/2006/main">
+  <p:cSld>
+    <p:spTree>
+      <p:nvGrpSpPr>
+        <p:cNvPr id="1" name=""/>
+        <p:cNvGrpSpPr/>
+        <p:nvPr/>
+      </p:nvGrpSpPr>
+      <p:grpSpPr>
+        <a:xfrm>
+          <a:off x="0" y="0"/>
+          <a:ext cx="0" cy="0"/>
+          <a:chOff x="0" y="0"/>
+          <a:chExt cx="0" cy="0"/>
+        </a:xfrm>
+      </p:grpSpPr>
+      <p:sp>
+        <p:nvSpPr>
+          <p:cNvPr id="2" name="제목 1"/>
+          <p:cNvSpPr>
+            <a:spLocks noGrp="1"/>
+          </p:cNvSpPr>
+          <p:nvPr>
+            <p:ph type="title" idx="0"/>
+          </p:nvPr>
+        </p:nvSpPr>
+        <p:spPr/>
+        <p:txBody>
+          <a:bodyPr>
+            <a:noAutofit/>
+          </a:bodyPr>
+          <a:p>
+            <a:pPr lvl="0" algn="l">
+              <a:defRPr/>
+            </a:pPr>
+            <a:r>
+              <a:rPr lang="ko-KR" altLang="en-US" sz="3300">
+                <a:latin typeface="맑은 고딕"/>
+                <a:cs typeface="한컴바탕"/>
+                <a:sym typeface="한컴바탕"/>
+              </a:rPr>
+              <a:t>온라인 정자상거래 플랫폼 </a:t>
+            </a:r>
+            <a:r>
+              <a:rPr lang="en-US" altLang="ko-KR" sz="3300">
+                <a:latin typeface="맑은 고딕"/>
+                <a:cs typeface="한컴바탕"/>
+                <a:sym typeface="한컴바탕"/>
+              </a:rPr>
+              <a:t>PM </a:t>
+            </a:r>
+            <a:r>
+              <a:rPr lang="ko-KR" altLang="en-US" sz="3300">
+                <a:latin typeface="맑은 고딕"/>
+                <a:cs typeface="한컴바탕"/>
+                <a:sym typeface="한컴바탕"/>
+              </a:rPr>
+              <a:t>만들기</a:t>
+            </a:r>
+            <a:br>
+              <a:rPr lang="ko-KR" altLang="en-US"/>
+            </a:br>
+            <a:r>
+              <a:rPr lang="en-US" altLang="ko-KR" sz="2000"/>
+              <a:t>Logical Data Modeling(RM)</a:t>
+            </a:r>
+            <a:endParaRPr lang="en-US" altLang="ko-KR" sz="2000"/>
+          </a:p>
+        </p:txBody>
+      </p:sp>
+      <p:pic>
+        <p:nvPicPr>
+          <p:cNvPr id="4" name="그림 3"/>
+          <p:cNvPicPr>
+            <a:picLocks noChangeAspect="1"/>
+          </p:cNvPicPr>
+          <p:nvPr/>
+        </p:nvPicPr>
+        <p:blipFill rotWithShape="1">
+          <a:blip r:embed="rId2"/>
+          <a:stretch>
+            <a:fillRect/>
+          </a:stretch>
+        </p:blipFill>
+        <p:spPr>
+          <a:xfrm>
+            <a:off x="1232990" y="1962549"/>
+            <a:ext cx="8504715" cy="4022341"/>
+          </a:xfrm>
+          <a:prstGeom prst="rect">
+            <a:avLst/>
+          </a:prstGeom>
+        </p:spPr>
+      </p:pic>
+    </p:spTree>
+    <p:extLst>
+      <p:ext uri="{BB962C8B-B14F-4D97-AF65-F5344CB8AC3E}">
+        <p14:creationId xmlns:p14="http://schemas.microsoft.com/office/powerpoint/2010/main" val="302309957"/>
       </p:ext>
     </p:extLst>
   </p:cSld>

</xml_diff>